<commit_message>
Completed first draft of the presentation
</commit_message>
<xml_diff>
--- a/2023-06-01 Dealing with Concurrency - Multi-Threading in Dotnet/Dotnet-Multi-Threading.pptx
+++ b/2023-06-01 Dealing with Concurrency - Multi-Threading in Dotnet/Dotnet-Multi-Threading.pptx
@@ -30,7 +30,6 @@
     <p:sldId id="311" r:id="rId24"/>
     <p:sldId id="313" r:id="rId25"/>
     <p:sldId id="289" r:id="rId26"/>
-    <p:sldId id="317" r:id="rId27"/>
   </p:sldIdLst>
   <p:sldSz cx="12192000" cy="6858000"/>
   <p:notesSz cx="6858000" cy="9144000"/>
@@ -8949,6 +8948,9 @@
           <a:bodyPr/>
           <a:lstStyle/>
           <a:p>
+            <a:pPr marL="0" indent="0">
+              <a:buNone/>
+            </a:pPr>
             <a:r>
               <a:rPr lang="tr-TR" dirty="0">
                 <a:latin typeface="Euclid Circular B" panose="020B0504000000000000" pitchFamily="34" charset="0"/>
@@ -8986,52 +8988,134 @@
             </a:r>
           </a:p>
           <a:p>
+            <a:endParaRPr lang="tr-TR" dirty="0">
+              <a:latin typeface="Euclid Circular B" panose="020B0504000000000000" pitchFamily="34" charset="0"/>
+              <a:ea typeface="Euclid Circular B" panose="020B0504000000000000" pitchFamily="34" charset="0"/>
+            </a:endParaRPr>
+          </a:p>
+          <a:p>
+            <a:pPr marL="0" indent="0">
+              <a:buNone/>
+            </a:pPr>
+            <a:r>
+              <a:rPr lang="tr-TR" b="1" dirty="0">
+                <a:latin typeface="Euclid Circular B" panose="020B0504000000000000" pitchFamily="34" charset="0"/>
+                <a:ea typeface="Euclid Circular B" panose="020B0504000000000000" pitchFamily="34" charset="0"/>
+              </a:rPr>
+              <a:t>Why </a:t>
+            </a:r>
             <a:r>
               <a:rPr lang="tr-TR" dirty="0">
                 <a:latin typeface="Euclid Circular B" panose="020B0504000000000000" pitchFamily="34" charset="0"/>
                 <a:ea typeface="Euclid Circular B" panose="020B0504000000000000" pitchFamily="34" charset="0"/>
               </a:rPr>
-              <a:t>Why we need it? Some examples:</a:t>
-            </a:r>
-          </a:p>
-          <a:p>
-            <a:pPr lvl="1"/>
+              <a:t>we need it? Some examples:</a:t>
+            </a:r>
+          </a:p>
+          <a:p>
             <a:r>
               <a:rPr lang="tr-TR" dirty="0">
                 <a:latin typeface="Euclid Circular B" panose="020B0504000000000000" pitchFamily="34" charset="0"/>
                 <a:ea typeface="Euclid Circular B" panose="020B0504000000000000" pitchFamily="34" charset="0"/>
               </a:rPr>
-              <a:t>To process a background job or message queue</a:t>
-            </a:r>
-          </a:p>
-          <a:p>
-            <a:pPr lvl="1"/>
+              <a:t>To process a background </a:t>
+            </a:r>
+            <a:r>
+              <a:rPr lang="tr-TR" b="1" dirty="0">
+                <a:latin typeface="Euclid Circular B" panose="020B0504000000000000" pitchFamily="34" charset="0"/>
+                <a:ea typeface="Euclid Circular B" panose="020B0504000000000000" pitchFamily="34" charset="0"/>
+              </a:rPr>
+              <a:t>job </a:t>
+            </a:r>
             <a:r>
               <a:rPr lang="tr-TR" dirty="0">
                 <a:latin typeface="Euclid Circular B" panose="020B0504000000000000" pitchFamily="34" charset="0"/>
                 <a:ea typeface="Euclid Circular B" panose="020B0504000000000000" pitchFamily="34" charset="0"/>
               </a:rPr>
-              <a:t>To synchronize access to a shared resource</a:t>
-            </a:r>
-          </a:p>
-          <a:p>
-            <a:pPr lvl="1"/>
+              <a:t>or </a:t>
+            </a:r>
+            <a:r>
+              <a:rPr lang="tr-TR" b="1" dirty="0">
+                <a:latin typeface="Euclid Circular B" panose="020B0504000000000000" pitchFamily="34" charset="0"/>
+                <a:ea typeface="Euclid Circular B" panose="020B0504000000000000" pitchFamily="34" charset="0"/>
+              </a:rPr>
+              <a:t>message queue</a:t>
+            </a:r>
+          </a:p>
+          <a:p>
             <a:r>
               <a:rPr lang="tr-TR" dirty="0">
                 <a:latin typeface="Euclid Circular B" panose="020B0504000000000000" pitchFamily="34" charset="0"/>
                 <a:ea typeface="Euclid Circular B" panose="020B0504000000000000" pitchFamily="34" charset="0"/>
               </a:rPr>
-              <a:t>Apply database migration scripts / seed initial data</a:t>
-            </a:r>
-          </a:p>
-          <a:p>
-            <a:pPr lvl="1"/>
+              <a:t>To synchronize access to a </a:t>
+            </a:r>
+            <a:r>
+              <a:rPr lang="tr-TR" b="1" dirty="0">
+                <a:latin typeface="Euclid Circular B" panose="020B0504000000000000" pitchFamily="34" charset="0"/>
+                <a:ea typeface="Euclid Circular B" panose="020B0504000000000000" pitchFamily="34" charset="0"/>
+              </a:rPr>
+              <a:t>shared resource</a:t>
+            </a:r>
+          </a:p>
+          <a:p>
             <a:r>
               <a:rPr lang="tr-TR" dirty="0">
                 <a:latin typeface="Euclid Circular B" panose="020B0504000000000000" pitchFamily="34" charset="0"/>
                 <a:ea typeface="Euclid Circular B" panose="020B0504000000000000" pitchFamily="34" charset="0"/>
               </a:rPr>
-              <a:t>To populate a cache object</a:t>
+              <a:t>Apply </a:t>
+            </a:r>
+            <a:r>
+              <a:rPr lang="tr-TR" b="1" dirty="0">
+                <a:latin typeface="Euclid Circular B" panose="020B0504000000000000" pitchFamily="34" charset="0"/>
+                <a:ea typeface="Euclid Circular B" panose="020B0504000000000000" pitchFamily="34" charset="0"/>
+              </a:rPr>
+              <a:t>database migration </a:t>
+            </a:r>
+            <a:r>
+              <a:rPr lang="tr-TR" dirty="0">
+                <a:latin typeface="Euclid Circular B" panose="020B0504000000000000" pitchFamily="34" charset="0"/>
+                <a:ea typeface="Euclid Circular B" panose="020B0504000000000000" pitchFamily="34" charset="0"/>
+              </a:rPr>
+              <a:t>scripts / seed initial data</a:t>
+            </a:r>
+          </a:p>
+          <a:p>
+            <a:r>
+              <a:rPr lang="tr-TR" dirty="0">
+                <a:latin typeface="Euclid Circular B" panose="020B0504000000000000" pitchFamily="34" charset="0"/>
+                <a:ea typeface="Euclid Circular B" panose="020B0504000000000000" pitchFamily="34" charset="0"/>
+              </a:rPr>
+              <a:t>To </a:t>
+            </a:r>
+            <a:r>
+              <a:rPr lang="tr-TR" b="1" dirty="0">
+                <a:latin typeface="Euclid Circular B" panose="020B0504000000000000" pitchFamily="34" charset="0"/>
+                <a:ea typeface="Euclid Circular B" panose="020B0504000000000000" pitchFamily="34" charset="0"/>
+              </a:rPr>
+              <a:t>populate </a:t>
+            </a:r>
+            <a:r>
+              <a:rPr lang="tr-TR" dirty="0">
+                <a:latin typeface="Euclid Circular B" panose="020B0504000000000000" pitchFamily="34" charset="0"/>
+                <a:ea typeface="Euclid Circular B" panose="020B0504000000000000" pitchFamily="34" charset="0"/>
+              </a:rPr>
+              <a:t>a </a:t>
+            </a:r>
+            <a:r>
+              <a:rPr lang="tr-TR" b="1" dirty="0">
+                <a:latin typeface="Euclid Circular B" panose="020B0504000000000000" pitchFamily="34" charset="0"/>
+                <a:ea typeface="Euclid Circular B" panose="020B0504000000000000" pitchFamily="34" charset="0"/>
+              </a:rPr>
+              <a:t>cache </a:t>
+            </a:r>
+            <a:r>
+              <a:rPr lang="tr-TR" dirty="0">
+                <a:latin typeface="Euclid Circular B" panose="020B0504000000000000" pitchFamily="34" charset="0"/>
+                <a:ea typeface="Euclid Circular B" panose="020B0504000000000000" pitchFamily="34" charset="0"/>
+              </a:rPr>
+              <a:t>object</a:t>
             </a:r>
             <a:endParaRPr lang="en-US" dirty="0">
               <a:latin typeface="Euclid Circular B" panose="020B0504000000000000" pitchFamily="34" charset="0"/>
@@ -9147,7 +9231,7 @@
                                         <p:tgtEl>
                                           <p:spTgt spid="3">
                                             <p:txEl>
-                                              <p:pRg st="1" end="1"/>
+                                              <p:pRg st="2" end="2"/>
                                             </p:txEl>
                                           </p:spTgt>
                                         </p:tgtEl>
@@ -9165,7 +9249,7 @@
                                         <p:tgtEl>
                                           <p:spTgt spid="3">
                                             <p:txEl>
-                                              <p:pRg st="1" end="1"/>
+                                              <p:pRg st="2" end="2"/>
                                             </p:txEl>
                                           </p:spTgt>
                                         </p:tgtEl>
@@ -9208,7 +9292,7 @@
                                         <p:tgtEl>
                                           <p:spTgt spid="3">
                                             <p:txEl>
-                                              <p:pRg st="2" end="2"/>
+                                              <p:pRg st="3" end="3"/>
                                             </p:txEl>
                                           </p:spTgt>
                                         </p:tgtEl>
@@ -9226,7 +9310,7 @@
                                         <p:tgtEl>
                                           <p:spTgt spid="3">
                                             <p:txEl>
-                                              <p:pRg st="2" end="2"/>
+                                              <p:pRg st="3" end="3"/>
                                             </p:txEl>
                                           </p:spTgt>
                                         </p:tgtEl>
@@ -9269,7 +9353,7 @@
                                         <p:tgtEl>
                                           <p:spTgt spid="3">
                                             <p:txEl>
-                                              <p:pRg st="3" end="3"/>
+                                              <p:pRg st="4" end="4"/>
                                             </p:txEl>
                                           </p:spTgt>
                                         </p:tgtEl>
@@ -9287,7 +9371,7 @@
                                         <p:tgtEl>
                                           <p:spTgt spid="3">
                                             <p:txEl>
-                                              <p:pRg st="3" end="3"/>
+                                              <p:pRg st="4" end="4"/>
                                             </p:txEl>
                                           </p:spTgt>
                                         </p:tgtEl>
@@ -9330,7 +9414,7 @@
                                         <p:tgtEl>
                                           <p:spTgt spid="3">
                                             <p:txEl>
-                                              <p:pRg st="4" end="4"/>
+                                              <p:pRg st="5" end="5"/>
                                             </p:txEl>
                                           </p:spTgt>
                                         </p:tgtEl>
@@ -9348,7 +9432,7 @@
                                         <p:tgtEl>
                                           <p:spTgt spid="3">
                                             <p:txEl>
-                                              <p:pRg st="4" end="4"/>
+                                              <p:pRg st="5" end="5"/>
                                             </p:txEl>
                                           </p:spTgt>
                                         </p:tgtEl>
@@ -9391,7 +9475,7 @@
                                         <p:tgtEl>
                                           <p:spTgt spid="3">
                                             <p:txEl>
-                                              <p:pRg st="5" end="5"/>
+                                              <p:pRg st="6" end="6"/>
                                             </p:txEl>
                                           </p:spTgt>
                                         </p:tgtEl>
@@ -9409,7 +9493,7 @@
                                         <p:tgtEl>
                                           <p:spTgt spid="3">
                                             <p:txEl>
-                                              <p:pRg st="5" end="5"/>
+                                              <p:pRg st="6" end="6"/>
                                             </p:txEl>
                                           </p:spTgt>
                                         </p:tgtEl>
@@ -10298,7 +10382,7 @@
         </p:spPr>
         <p:txBody>
           <a:bodyPr>
-            <a:normAutofit/>
+            <a:normAutofit lnSpcReduction="10000"/>
           </a:bodyPr>
           <a:lstStyle/>
           <a:p>
@@ -10306,7 +10390,7 @@
               <a:buNone/>
             </a:pPr>
             <a:r>
-              <a:rPr lang="en-US" sz="2600" b="1" dirty="0">
+              <a:rPr lang="en-US" sz="3200" b="1" dirty="0">
                 <a:latin typeface="Euclid Circular B" panose="020B0504000000000000" pitchFamily="34" charset="0"/>
                 <a:ea typeface="Euclid Circular B" panose="020B0504000000000000" pitchFamily="34" charset="0"/>
               </a:rPr>
@@ -10318,14 +10402,14 @@
               <a:buNone/>
             </a:pPr>
             <a:r>
-              <a:rPr lang="en-US" sz="1400" dirty="0">
+              <a:rPr lang="en-US" b="1" dirty="0">
                 <a:latin typeface="Euclid Circular B" panose="020B0504000000000000" pitchFamily="34" charset="0"/>
                 <a:ea typeface="Euclid Circular B" panose="020B0504000000000000" pitchFamily="34" charset="0"/>
                 <a:hlinkClick r:id="rId3"/>
               </a:rPr>
               <a:t>https://github.com/hikalkan/presentations</a:t>
             </a:r>
-            <a:endParaRPr lang="en-US" sz="1400" dirty="0">
+            <a:endParaRPr lang="en-US" b="1" dirty="0">
               <a:latin typeface="Euclid Circular B" panose="020B0504000000000000" pitchFamily="34" charset="0"/>
               <a:ea typeface="Euclid Circular B" panose="020B0504000000000000" pitchFamily="34" charset="0"/>
             </a:endParaRPr>
@@ -10334,7 +10418,7 @@
             <a:pPr marL="0" indent="0">
               <a:buNone/>
             </a:pPr>
-            <a:endParaRPr lang="en-US" sz="1000" dirty="0">
+            <a:endParaRPr lang="en-US" sz="1100" dirty="0">
               <a:latin typeface="Euclid Circular B" panose="020B0504000000000000" pitchFamily="34" charset="0"/>
               <a:ea typeface="Euclid Circular B" panose="020B0504000000000000" pitchFamily="34" charset="0"/>
             </a:endParaRPr>
@@ -10344,7 +10428,7 @@
               <a:buNone/>
             </a:pPr>
             <a:r>
-              <a:rPr lang="en-US" sz="2600" b="1" dirty="0">
+              <a:rPr lang="en-US" sz="3200" b="1" dirty="0">
                 <a:latin typeface="Euclid Circular B" panose="020B0504000000000000" pitchFamily="34" charset="0"/>
                 <a:ea typeface="Euclid Circular B" panose="020B0504000000000000" pitchFamily="34" charset="0"/>
               </a:rPr>
@@ -10356,14 +10440,21 @@
               <a:buNone/>
             </a:pPr>
             <a:r>
-              <a:rPr lang="en-US" sz="1600" dirty="0">
+              <a:rPr lang="tr-TR" sz="2000" b="1" dirty="0">
                 <a:latin typeface="Euclid Circular B" panose="020B0504000000000000" pitchFamily="34" charset="0"/>
                 <a:ea typeface="Euclid Circular B" panose="020B0504000000000000" pitchFamily="34" charset="0"/>
               </a:rPr>
-              <a:t>Home: </a:t>
-            </a:r>
-            <a:r>
-              <a:rPr lang="en-US" sz="1600" dirty="0">
+              <a:t>Website</a:t>
+            </a:r>
+            <a:r>
+              <a:rPr lang="en-US" sz="2000" dirty="0">
+                <a:latin typeface="Euclid Circular B" panose="020B0504000000000000" pitchFamily="34" charset="0"/>
+                <a:ea typeface="Euclid Circular B" panose="020B0504000000000000" pitchFamily="34" charset="0"/>
+              </a:rPr>
+              <a:t>: </a:t>
+            </a:r>
+            <a:r>
+              <a:rPr lang="en-US" sz="2000" dirty="0">
                 <a:latin typeface="Euclid Circular B" panose="020B0504000000000000" pitchFamily="34" charset="0"/>
                 <a:ea typeface="Euclid Circular B" panose="020B0504000000000000" pitchFamily="34" charset="0"/>
                 <a:hlinkClick r:id="rId4"/>
@@ -10371,7 +10462,7 @@
               <a:t>https://halilibrahimkalkan.com</a:t>
             </a:r>
             <a:r>
-              <a:rPr lang="en-US" sz="1600" dirty="0">
+              <a:rPr lang="en-US" sz="2000" dirty="0">
                 <a:latin typeface="Euclid Circular B" panose="020B0504000000000000" pitchFamily="34" charset="0"/>
                 <a:ea typeface="Euclid Circular B" panose="020B0504000000000000" pitchFamily="34" charset="0"/>
               </a:rPr>
@@ -10383,18 +10474,48 @@
               <a:buNone/>
             </a:pPr>
             <a:r>
-              <a:rPr lang="en-US" sz="1600" dirty="0">
+              <a:rPr lang="en-US" sz="2000" b="1" dirty="0">
                 <a:latin typeface="Euclid Circular B" panose="020B0504000000000000" pitchFamily="34" charset="0"/>
                 <a:ea typeface="Euclid Circular B" panose="020B0504000000000000" pitchFamily="34" charset="0"/>
               </a:rPr>
-              <a:t>GitHub: @hikalkan | Twitter: @hibrahimkalkan</a:t>
-            </a:r>
+              <a:t>GitHub</a:t>
+            </a:r>
+            <a:r>
+              <a:rPr lang="en-US" sz="2000" dirty="0">
+                <a:latin typeface="Euclid Circular B" panose="020B0504000000000000" pitchFamily="34" charset="0"/>
+                <a:ea typeface="Euclid Circular B" panose="020B0504000000000000" pitchFamily="34" charset="0"/>
+              </a:rPr>
+              <a:t>: @hikalkan</a:t>
+            </a:r>
+            <a:endParaRPr lang="tr-TR" sz="2000" dirty="0">
+              <a:latin typeface="Euclid Circular B" panose="020B0504000000000000" pitchFamily="34" charset="0"/>
+              <a:ea typeface="Euclid Circular B" panose="020B0504000000000000" pitchFamily="34" charset="0"/>
+            </a:endParaRPr>
           </a:p>
           <a:p>
             <a:pPr marL="0" indent="0">
               <a:buNone/>
             </a:pPr>
-            <a:endParaRPr lang="en-US" sz="1000" dirty="0">
+            <a:r>
+              <a:rPr lang="en-US" sz="2000" b="1" dirty="0">
+                <a:latin typeface="Euclid Circular B" panose="020B0504000000000000" pitchFamily="34" charset="0"/>
+                <a:ea typeface="Euclid Circular B" panose="020B0504000000000000" pitchFamily="34" charset="0"/>
+              </a:rPr>
+              <a:t>Twitter</a:t>
+            </a:r>
+            <a:r>
+              <a:rPr lang="en-US" sz="2000" dirty="0">
+                <a:latin typeface="Euclid Circular B" panose="020B0504000000000000" pitchFamily="34" charset="0"/>
+                <a:ea typeface="Euclid Circular B" panose="020B0504000000000000" pitchFamily="34" charset="0"/>
+              </a:rPr>
+              <a:t>: @hibrahimkalkan</a:t>
+            </a:r>
+          </a:p>
+          <a:p>
+            <a:pPr marL="0" indent="0">
+              <a:buNone/>
+            </a:pPr>
+            <a:endParaRPr lang="en-US" sz="1100" dirty="0">
               <a:latin typeface="Euclid Circular B" panose="020B0504000000000000" pitchFamily="34" charset="0"/>
               <a:ea typeface="Euclid Circular B" panose="020B0504000000000000" pitchFamily="34" charset="0"/>
             </a:endParaRPr>
@@ -10404,7 +10525,7 @@
               <a:buNone/>
             </a:pPr>
             <a:r>
-              <a:rPr lang="en-US" sz="2600" b="1" dirty="0">
+              <a:rPr lang="en-US" sz="2400" b="1" dirty="0">
                 <a:latin typeface="Euclid Circular B" panose="020B0504000000000000" pitchFamily="34" charset="0"/>
                 <a:ea typeface="Euclid Circular B" panose="020B0504000000000000" pitchFamily="34" charset="0"/>
               </a:rPr>
@@ -10458,115 +10579,6 @@
     <p:extLst>
       <p:ext uri="{BB962C8B-B14F-4D97-AF65-F5344CB8AC3E}">
         <p14:creationId xmlns:p14="http://schemas.microsoft.com/office/powerpoint/2010/main" val="1625585404"/>
-      </p:ext>
-    </p:extLst>
-  </p:cSld>
-  <p:clrMapOvr>
-    <a:masterClrMapping/>
-  </p:clrMapOvr>
-</p:sld>
-</file>
-
-<file path=ppt/slides/slide26.xml><?xml version="1.0" encoding="utf-8"?>
-<p:sld xmlns:a="http://schemas.openxmlformats.org/drawingml/2006/main" xmlns:r="http://schemas.openxmlformats.org/officeDocument/2006/relationships" xmlns:p="http://schemas.openxmlformats.org/presentationml/2006/main">
-  <p:cSld>
-    <p:bg>
-      <p:bgPr>
-        <a:blipFill dpi="0" rotWithShape="1">
-          <a:blip r:embed="rId2">
-            <a:lum/>
-          </a:blip>
-          <a:srcRect/>
-          <a:stretch>
-            <a:fillRect/>
-          </a:stretch>
-        </a:blipFill>
-        <a:effectLst/>
-      </p:bgPr>
-    </p:bg>
-    <p:spTree>
-      <p:nvGrpSpPr>
-        <p:cNvPr id="1" name=""/>
-        <p:cNvGrpSpPr/>
-        <p:nvPr/>
-      </p:nvGrpSpPr>
-      <p:grpSpPr>
-        <a:xfrm>
-          <a:off x="0" y="0"/>
-          <a:ext cx="0" cy="0"/>
-          <a:chOff x="0" y="0"/>
-          <a:chExt cx="0" cy="0"/>
-        </a:xfrm>
-      </p:grpSpPr>
-      <p:sp>
-        <p:nvSpPr>
-          <p:cNvPr id="2" name="Title 1">
-            <a:extLst>
-              <a:ext uri="{FF2B5EF4-FFF2-40B4-BE49-F238E27FC236}">
-                <a16:creationId xmlns:a16="http://schemas.microsoft.com/office/drawing/2014/main" id="{55E11F08-6CA0-48F1-AD67-97430DDA07F0}"/>
-              </a:ext>
-            </a:extLst>
-          </p:cNvPr>
-          <p:cNvSpPr>
-            <a:spLocks noGrp="1"/>
-          </p:cNvSpPr>
-          <p:nvPr>
-            <p:ph type="title"/>
-          </p:nvPr>
-        </p:nvSpPr>
-        <p:spPr/>
-        <p:txBody>
-          <a:bodyPr/>
-          <a:lstStyle/>
-          <a:p>
-            <a:r>
-              <a:rPr lang="en-US" b="1" dirty="0">
-                <a:solidFill>
-                  <a:srgbClr val="292D33"/>
-                </a:solidFill>
-                <a:latin typeface="Euclid Circular B" panose="020B0504000000000000" pitchFamily="34" charset="0"/>
-                <a:ea typeface="Euclid Circular B" panose="020B0504000000000000" pitchFamily="34" charset="0"/>
-              </a:rPr>
-              <a:t>Topic title</a:t>
-            </a:r>
-          </a:p>
-        </p:txBody>
-      </p:sp>
-      <p:sp>
-        <p:nvSpPr>
-          <p:cNvPr id="3" name="Content Placeholder 2">
-            <a:extLst>
-              <a:ext uri="{FF2B5EF4-FFF2-40B4-BE49-F238E27FC236}">
-                <a16:creationId xmlns:a16="http://schemas.microsoft.com/office/drawing/2014/main" id="{891C7693-D3DF-4635-96F4-97F3B4136FDF}"/>
-              </a:ext>
-            </a:extLst>
-          </p:cNvPr>
-          <p:cNvSpPr>
-            <a:spLocks noGrp="1"/>
-          </p:cNvSpPr>
-          <p:nvPr>
-            <p:ph idx="1"/>
-          </p:nvPr>
-        </p:nvSpPr>
-        <p:spPr/>
-        <p:txBody>
-          <a:bodyPr/>
-          <a:lstStyle/>
-          <a:p>
-            <a:r>
-              <a:rPr lang="en-US" dirty="0">
-                <a:latin typeface="Euclid Circular B" panose="020B0504000000000000" pitchFamily="34" charset="0"/>
-                <a:ea typeface="Euclid Circular B" panose="020B0504000000000000" pitchFamily="34" charset="0"/>
-              </a:rPr>
-              <a:t>Content</a:t>
-            </a:r>
-          </a:p>
-        </p:txBody>
-      </p:sp>
-    </p:spTree>
-    <p:extLst>
-      <p:ext uri="{BB962C8B-B14F-4D97-AF65-F5344CB8AC3E}">
-        <p14:creationId xmlns:p14="http://schemas.microsoft.com/office/powerpoint/2010/main" val="3734297926"/>
       </p:ext>
     </p:extLst>
   </p:cSld>

</xml_diff>